<commit_message>
getting there up to manova
</commit_message>
<xml_diff>
--- a/docs/lectures/lecture_17/17_01_lecture_powerpoint.pptx
+++ b/docs/lectures/lecture_17/17_01_lecture_powerpoint.pptx
@@ -12,6 +12,17 @@
     <p:sldId id="260" r:id="rId6"/>
     <p:sldId id="261" r:id="rId7"/>
     <p:sldId id="262" r:id="rId8"/>
+    <p:sldId id="263" r:id="rId9"/>
+    <p:sldId id="264" r:id="rId10"/>
+    <p:sldId id="265" r:id="rId11"/>
+    <p:sldId id="266" r:id="rId12"/>
+    <p:sldId id="267" r:id="rId13"/>
+    <p:sldId id="268" r:id="rId14"/>
+    <p:sldId id="269" r:id="rId15"/>
+    <p:sldId id="270" r:id="rId16"/>
+    <p:sldId id="271" r:id="rId17"/>
+    <p:sldId id="272" r:id="rId18"/>
+    <p:sldId id="273" r:id="rId19"/>
   </p:sldIdLst>
   <p:sldSz cx="9144000" cy="5143500" type="screen16x9"/>
   <p:notesSz cx="6858000" cy="9144000"/>
@@ -3299,7 +3310,7 @@
             </a:pPr>
             <a:r>
               <a:rPr/>
-              <a:t>Lecture 17 - xxxxxx</a:t>
+              <a:t>Lecture 17 - Multivariate STATS</a:t>
             </a:r>
           </a:p>
         </p:txBody>
@@ -3336,6 +3347,1286 @@
           </a:p>
         </p:txBody>
       </p:sp>
+    </p:spTree>
+  </p:cSld>
+</p:sld>
+</file>
+
+<file path=ppt/slides/slide10.xml><?xml version="1.0" encoding="utf-8"?>
+<p:sld xmlns:a="http://schemas.openxmlformats.org/drawingml/2006/main" xmlns:r="http://schemas.openxmlformats.org/officeDocument/2006/relationships" xmlns:p="http://schemas.openxmlformats.org/presentationml/2006/main">
+  <p:cSld>
+    <p:spTree>
+      <p:nvGrpSpPr>
+        <p:cNvPr id="1" name=""/>
+        <p:cNvGrpSpPr/>
+        <p:nvPr/>
+      </p:nvGrpSpPr>
+      <p:grpSpPr>
+        <a:xfrm>
+          <a:off x="0" y="0"/>
+          <a:ext cx="0" cy="0"/>
+          <a:chOff x="0" y="0"/>
+          <a:chExt cx="0" cy="0"/>
+        </a:xfrm>
+      </p:grpSpPr>
+      <p:sp>
+        <p:nvSpPr>
+          <p:cNvPr id="2" name="Title 1"/>
+          <p:cNvSpPr>
+            <a:spLocks noGrp="1"/>
+          </p:cNvSpPr>
+          <p:nvPr>
+            <p:ph type="title"/>
+          </p:nvPr>
+        </p:nvSpPr>
+        <p:spPr>
+          <a:xfrm>
+            <a:off x="0" y="0"/>
+            <a:ext cx="9144000" cy="602780"/>
+          </a:xfrm>
+          <a:solidFill>
+            <a:srgbClr val="70121D"/>
+          </a:solidFill>
+        </p:spPr>
+        <p:txBody>
+          <a:bodyPr/>
+          <a:lstStyle/>
+          <a:p>
+            <a:pPr lvl="0" indent="0" marL="0">
+              <a:buNone/>
+            </a:pPr>
+            <a:r>
+              <a:rPr/>
+              <a:t>Distance and Dissimilarity Measures</a:t>
+            </a:r>
+          </a:p>
+        </p:txBody>
+      </p:sp>
+      <p:sp>
+        <p:nvSpPr>
+          <p:cNvPr id="3" name="Content Placeholder 2"/>
+          <p:cNvSpPr>
+            <a:spLocks noGrp="1"/>
+          </p:cNvSpPr>
+          <p:nvPr>
+            <p:ph idx="1" sz="half"/>
+          </p:nvPr>
+        </p:nvSpPr>
+        <p:spPr/>
+        <p:txBody>
+          <a:bodyPr/>
+          <a:lstStyle/>
+          <a:p>
+            <a:pPr lvl="0"/>
+            <a:r>
+              <a:rPr/>
+              <a:t>Measure how different objects are in multivariate space</a:t>
+            </a:r>
+          </a:p>
+          <a:p>
+            <a:pPr lvl="0"/>
+            <a:r>
+              <a:rPr/>
+              <a:t>Common measures:</a:t>
+            </a:r>
+          </a:p>
+          <a:p>
+            <a:pPr lvl="1"/>
+            <a:r>
+              <a:rPr b="1"/>
+              <a:t>Euclidean distance</a:t>
+            </a:r>
+            <a:r>
+              <a:rPr/>
+              <a:t>: direct geometric distance</a:t>
+            </a:r>
+          </a:p>
+          <a:p>
+            <a:pPr lvl="1"/>
+            <a:r>
+              <a:rPr b="1"/>
+              <a:t>Manhattan distance</a:t>
+            </a:r>
+            <a:r>
+              <a:rPr/>
+              <a:t>: sum of absolute differences</a:t>
+            </a:r>
+          </a:p>
+          <a:p>
+            <a:pPr lvl="1"/>
+            <a:r>
+              <a:rPr b="1"/>
+              <a:t>Bray-Curtis</a:t>
+            </a:r>
+            <a:r>
+              <a:rPr/>
+              <a:t>: good for species abundance data</a:t>
+            </a:r>
+          </a:p>
+          <a:p>
+            <a:pPr lvl="1"/>
+            <a:r>
+              <a:rPr b="1"/>
+              <a:t>Kulczynski</a:t>
+            </a:r>
+            <a:r>
+              <a:rPr/>
+              <a:t>: for abundance data with zeros</a:t>
+            </a:r>
+          </a:p>
+          <a:p>
+            <a:pPr lvl="0"/>
+            <a:r>
+              <a:rPr/>
+              <a:t>Used in cluster analysis, MDS, and other techniques</a:t>
+            </a:r>
+          </a:p>
+          <a:p>
+            <a:pPr lvl="0"/>
+            <a:r>
+              <a:rPr/>
+              <a:t>Create dissimilarity matrices for analysis</a:t>
+            </a:r>
+          </a:p>
+        </p:txBody>
+      </p:sp>
+      <p:pic>
+        <p:nvPicPr>
+          <p:cNvPr descr="17_01_lecture_powerpoint_files/figure-pptx/unnamed-chunk-5-1.png" id="0" name="Picture 1"/>
+          <p:cNvPicPr>
+            <a:picLocks noGrp="1" noChangeAspect="1"/>
+          </p:cNvPicPr>
+          <p:nvPr/>
+        </p:nvPicPr>
+        <p:blipFill>
+          <a:blip r:embed="rId2"/>
+          <a:stretch>
+            <a:fillRect/>
+          </a:stretch>
+        </p:blipFill>
+        <p:spPr bwMode="auto">
+          <a:xfrm>
+            <a:off x="6121400" y="812800"/>
+            <a:ext cx="2781300" cy="4165600"/>
+          </a:xfrm>
+          <a:prstGeom prst="rect">
+            <a:avLst/>
+          </a:prstGeom>
+          <a:noFill/>
+          <a:ln w="9525">
+            <a:noFill/>
+            <a:headEnd/>
+            <a:tailEnd/>
+          </a:ln>
+        </p:spPr>
+      </p:pic>
+    </p:spTree>
+  </p:cSld>
+</p:sld>
+</file>
+
+<file path=ppt/slides/slide11.xml><?xml version="1.0" encoding="utf-8"?>
+<p:sld xmlns:a="http://schemas.openxmlformats.org/drawingml/2006/main" xmlns:r="http://schemas.openxmlformats.org/officeDocument/2006/relationships" xmlns:p="http://schemas.openxmlformats.org/presentationml/2006/main">
+  <p:cSld>
+    <p:spTree>
+      <p:nvGrpSpPr>
+        <p:cNvPr id="1" name=""/>
+        <p:cNvGrpSpPr/>
+        <p:nvPr/>
+      </p:nvGrpSpPr>
+      <p:grpSpPr>
+        <a:xfrm>
+          <a:off x="0" y="0"/>
+          <a:ext cx="0" cy="0"/>
+          <a:chOff x="0" y="0"/>
+          <a:chExt cx="0" cy="0"/>
+        </a:xfrm>
+      </p:grpSpPr>
+      <p:sp>
+        <p:nvSpPr>
+          <p:cNvPr id="2" name="Title 1"/>
+          <p:cNvSpPr>
+            <a:spLocks noGrp="1"/>
+          </p:cNvSpPr>
+          <p:nvPr>
+            <p:ph type="title"/>
+          </p:nvPr>
+        </p:nvSpPr>
+        <p:spPr>
+          <a:xfrm>
+            <a:off x="0" y="0"/>
+            <a:ext cx="9144000" cy="602780"/>
+          </a:xfrm>
+          <a:solidFill>
+            <a:srgbClr val="70121D"/>
+          </a:solidFill>
+        </p:spPr>
+        <p:txBody>
+          <a:bodyPr/>
+          <a:lstStyle/>
+          <a:p>
+            <a:pPr lvl="0" indent="0" marL="0">
+              <a:buNone/>
+            </a:pPr>
+            <a:r>
+              <a:rPr/>
+              <a:t>Data Transformations &amp; Standardization</a:t>
+            </a:r>
+          </a:p>
+        </p:txBody>
+      </p:sp>
+      <p:sp>
+        <p:nvSpPr>
+          <p:cNvPr id="3" name="Content Placeholder 2"/>
+          <p:cNvSpPr>
+            <a:spLocks noGrp="1"/>
+          </p:cNvSpPr>
+          <p:nvPr>
+            <p:ph idx="1" sz="half"/>
+          </p:nvPr>
+        </p:nvSpPr>
+        <p:spPr/>
+        <p:txBody>
+          <a:bodyPr/>
+          <a:lstStyle/>
+          <a:p>
+            <a:pPr lvl="0" indent="0" marL="0">
+              <a:spcBef>
+                <a:spcPts val="3000"/>
+              </a:spcBef>
+              <a:buNone/>
+            </a:pPr>
+            <a:r>
+              <a:rPr b="1"/>
+              <a:t>Common Approaches</a:t>
+            </a:r>
+          </a:p>
+          <a:p>
+            <a:pPr lvl="0" indent="0" marL="0">
+              <a:buNone/>
+            </a:pPr>
+            <a:r>
+              <a:rPr b="1"/>
+              <a:t>Transformations</a:t>
+            </a:r>
+            <a:r>
+              <a:rPr/>
+              <a:t>: - Log transformation for skewed data - Root transformations for count data - Fourth-root for species abundance data</a:t>
+            </a:r>
+          </a:p>
+          <a:p>
+            <a:pPr lvl="0" indent="0" marL="0">
+              <a:buNone/>
+            </a:pPr>
+            <a:r>
+              <a:rPr b="1"/>
+              <a:t>Standardization</a:t>
+            </a:r>
+            <a:r>
+              <a:rPr/>
+              <a:t>: - Centering: subtract mean (mean = 0) - Standardization: divide by SD (SD = 1) - Crucial for variables with different units - May not be appropriate for species data</a:t>
+            </a:r>
+          </a:p>
+        </p:txBody>
+      </p:sp>
+      <p:pic>
+        <p:nvPicPr>
+          <p:cNvPr descr="17_01_lecture_powerpoint_files/figure-pptx/unnamed-chunk-6-1.png" id="0" name="Picture 1"/>
+          <p:cNvPicPr>
+            <a:picLocks noGrp="1" noChangeAspect="1"/>
+          </p:cNvPicPr>
+          <p:nvPr/>
+        </p:nvPicPr>
+        <p:blipFill>
+          <a:blip r:embed="rId2"/>
+          <a:stretch>
+            <a:fillRect/>
+          </a:stretch>
+        </p:blipFill>
+        <p:spPr bwMode="auto">
+          <a:xfrm>
+            <a:off x="6121400" y="812800"/>
+            <a:ext cx="2781300" cy="4165600"/>
+          </a:xfrm>
+          <a:prstGeom prst="rect">
+            <a:avLst/>
+          </a:prstGeom>
+          <a:noFill/>
+          <a:ln w="9525">
+            <a:noFill/>
+            <a:headEnd/>
+            <a:tailEnd/>
+          </a:ln>
+        </p:spPr>
+      </p:pic>
+    </p:spTree>
+  </p:cSld>
+</p:sld>
+</file>
+
+<file path=ppt/slides/slide12.xml><?xml version="1.0" encoding="utf-8"?>
+<p:sld xmlns:a="http://schemas.openxmlformats.org/drawingml/2006/main" xmlns:r="http://schemas.openxmlformats.org/officeDocument/2006/relationships" xmlns:p="http://schemas.openxmlformats.org/presentationml/2006/main">
+  <p:cSld>
+    <p:spTree>
+      <p:nvGrpSpPr>
+        <p:cNvPr id="1" name=""/>
+        <p:cNvGrpSpPr/>
+        <p:nvPr/>
+      </p:nvGrpSpPr>
+      <p:grpSpPr>
+        <a:xfrm>
+          <a:off x="0" y="0"/>
+          <a:ext cx="0" cy="0"/>
+          <a:chOff x="0" y="0"/>
+          <a:chExt cx="0" cy="0"/>
+        </a:xfrm>
+      </p:grpSpPr>
+      <p:sp>
+        <p:nvSpPr>
+          <p:cNvPr id="3" name="Content Placeholder 2"/>
+          <p:cNvSpPr>
+            <a:spLocks noGrp="1"/>
+          </p:cNvSpPr>
+          <p:nvPr>
+            <p:ph idx="1"/>
+          </p:nvPr>
+        </p:nvSpPr>
+        <p:spPr/>
+        <p:txBody>
+          <a:bodyPr/>
+          <a:lstStyle/>
+          <a:p>
+            <a:pPr lvl="0" indent="0" marL="1270000">
+              <a:buNone/>
+            </a:pPr>
+            <a:r>
+              <a:rPr sz="2000" b="1"/>
+              <a:t>Why standardize?</a:t>
+            </a:r>
+          </a:p>
+          <a:p>
+            <a:pPr lvl="0" indent="0" marL="1270000">
+              <a:buNone/>
+            </a:pPr>
+            <a:r>
+              <a:rPr sz="2000"/>
+              <a:t>Standardization ensures all variables contribute equally to the analysis regardless of their original units or scales of measurement. Without it, variables with larger values or variances would dominate the results.</a:t>
+            </a:r>
+          </a:p>
+        </p:txBody>
+      </p:sp>
+    </p:spTree>
+  </p:cSld>
+</p:sld>
+</file>
+
+<file path=ppt/slides/slide13.xml><?xml version="1.0" encoding="utf-8"?>
+<p:sld xmlns:a="http://schemas.openxmlformats.org/drawingml/2006/main" xmlns:r="http://schemas.openxmlformats.org/officeDocument/2006/relationships" xmlns:p="http://schemas.openxmlformats.org/presentationml/2006/main">
+  <p:cSld>
+    <p:spTree>
+      <p:nvGrpSpPr>
+        <p:cNvPr id="1" name=""/>
+        <p:cNvGrpSpPr/>
+        <p:nvPr/>
+      </p:nvGrpSpPr>
+      <p:grpSpPr>
+        <a:xfrm>
+          <a:off x="0" y="0"/>
+          <a:ext cx="0" cy="0"/>
+          <a:chOff x="0" y="0"/>
+          <a:chExt cx="0" cy="0"/>
+        </a:xfrm>
+      </p:grpSpPr>
+      <p:sp>
+        <p:nvSpPr>
+          <p:cNvPr id="2" name="Title 1"/>
+          <p:cNvSpPr>
+            <a:spLocks noGrp="1"/>
+          </p:cNvSpPr>
+          <p:nvPr>
+            <p:ph type="title"/>
+          </p:nvPr>
+        </p:nvSpPr>
+        <p:spPr>
+          <a:xfrm>
+            <a:off x="0" y="0"/>
+            <a:ext cx="9144000" cy="602780"/>
+          </a:xfrm>
+          <a:solidFill>
+            <a:srgbClr val="70121D"/>
+          </a:solidFill>
+        </p:spPr>
+        <p:txBody>
+          <a:bodyPr/>
+          <a:lstStyle/>
+          <a:p>
+            <a:pPr lvl="0" indent="0" marL="0">
+              <a:buNone/>
+            </a:pPr>
+            <a:r>
+              <a:rPr/>
+              <a:t>Multivariate Graphics</a:t>
+            </a:r>
+          </a:p>
+        </p:txBody>
+      </p:sp>
+      <p:sp>
+        <p:nvSpPr>
+          <p:cNvPr id="3" name="Content Placeholder 2"/>
+          <p:cNvSpPr>
+            <a:spLocks noGrp="1"/>
+          </p:cNvSpPr>
+          <p:nvPr>
+            <p:ph idx="1" sz="half"/>
+          </p:nvPr>
+        </p:nvSpPr>
+        <p:spPr/>
+        <p:txBody>
+          <a:bodyPr/>
+          <a:lstStyle/>
+          <a:p>
+            <a:pPr lvl="0" indent="0" marL="0">
+              <a:spcBef>
+                <a:spcPts val="3000"/>
+              </a:spcBef>
+              <a:buNone/>
+            </a:pPr>
+            <a:r>
+              <a:rPr b="1"/>
+              <a:t>Visual Representation Methods</a:t>
+            </a:r>
+          </a:p>
+          <a:p>
+            <a:pPr lvl="0"/>
+            <a:r>
+              <a:rPr b="1"/>
+              <a:t>SPLOMS/Scatterplot Matrices</a:t>
+            </a:r>
+            <a:r>
+              <a:rPr/>
+              <a:t>: show bivariate relationships</a:t>
+            </a:r>
+          </a:p>
+          <a:p>
+            <a:pPr lvl="0"/>
+            <a:r>
+              <a:rPr b="1"/>
+              <a:t>Star plots</a:t>
+            </a:r>
+            <a:r>
+              <a:rPr/>
+              <a:t>: display multiple variables per object</a:t>
+            </a:r>
+          </a:p>
+          <a:p>
+            <a:pPr lvl="0"/>
+            <a:r>
+              <a:rPr b="1"/>
+              <a:t>Chernoff faces</a:t>
+            </a:r>
+            <a:r>
+              <a:rPr/>
+              <a:t>: represent variables as facial features</a:t>
+            </a:r>
+          </a:p>
+          <a:p>
+            <a:pPr lvl="0"/>
+            <a:r>
+              <a:rPr b="1"/>
+              <a:t>Heatmaps</a:t>
+            </a:r>
+            <a:r>
+              <a:rPr/>
+              <a:t>: visualize data matrices with color</a:t>
+            </a:r>
+          </a:p>
+          <a:p>
+            <a:pPr lvl="0"/>
+            <a:r>
+              <a:rPr b="1"/>
+              <a:t>Biplots</a:t>
+            </a:r>
+            <a:r>
+              <a:rPr/>
+              <a:t>: show objects and variables together</a:t>
+            </a:r>
+          </a:p>
+          <a:p>
+            <a:pPr lvl="0"/>
+            <a:r>
+              <a:rPr b="1"/>
+              <a:t>Ordination plots</a:t>
+            </a:r>
+            <a:r>
+              <a:rPr/>
+              <a:t>: visualize relationships in reduced dimensions</a:t>
+            </a:r>
+          </a:p>
+        </p:txBody>
+      </p:sp>
+      <p:pic>
+        <p:nvPicPr>
+          <p:cNvPr descr="17_01_lecture_powerpoint_files/figure-pptx/unnamed-chunk-7-1.png" id="0" name="Picture 1"/>
+          <p:cNvPicPr>
+            <a:picLocks noGrp="1" noChangeAspect="1"/>
+          </p:cNvPicPr>
+          <p:nvPr/>
+        </p:nvPicPr>
+        <p:blipFill>
+          <a:blip r:embed="rId2"/>
+          <a:stretch>
+            <a:fillRect/>
+          </a:stretch>
+        </p:blipFill>
+        <p:spPr bwMode="auto">
+          <a:xfrm>
+            <a:off x="6121400" y="812800"/>
+            <a:ext cx="2781300" cy="4165600"/>
+          </a:xfrm>
+          <a:prstGeom prst="rect">
+            <a:avLst/>
+          </a:prstGeom>
+          <a:noFill/>
+          <a:ln w="9525">
+            <a:noFill/>
+            <a:headEnd/>
+            <a:tailEnd/>
+          </a:ln>
+        </p:spPr>
+      </p:pic>
+    </p:spTree>
+  </p:cSld>
+</p:sld>
+</file>
+
+<file path=ppt/slides/slide14.xml><?xml version="1.0" encoding="utf-8"?>
+<p:sld xmlns:a="http://schemas.openxmlformats.org/drawingml/2006/main" xmlns:r="http://schemas.openxmlformats.org/officeDocument/2006/relationships" xmlns:p="http://schemas.openxmlformats.org/presentationml/2006/main">
+  <p:cSld>
+    <p:spTree>
+      <p:nvGrpSpPr>
+        <p:cNvPr id="1" name=""/>
+        <p:cNvGrpSpPr/>
+        <p:nvPr/>
+      </p:nvGrpSpPr>
+      <p:grpSpPr>
+        <a:xfrm>
+          <a:off x="0" y="0"/>
+          <a:ext cx="0" cy="0"/>
+          <a:chOff x="0" y="0"/>
+          <a:chExt cx="0" cy="0"/>
+        </a:xfrm>
+      </p:grpSpPr>
+      <p:sp>
+        <p:nvSpPr>
+          <p:cNvPr id="2" name="Title 1"/>
+          <p:cNvSpPr>
+            <a:spLocks noGrp="1"/>
+          </p:cNvSpPr>
+          <p:nvPr>
+            <p:ph type="title"/>
+          </p:nvPr>
+        </p:nvSpPr>
+        <p:spPr>
+          <a:xfrm>
+            <a:off x="0" y="0"/>
+            <a:ext cx="9144000" cy="602780"/>
+          </a:xfrm>
+          <a:solidFill>
+            <a:srgbClr val="70121D"/>
+          </a:solidFill>
+        </p:spPr>
+        <p:txBody>
+          <a:bodyPr/>
+          <a:lstStyle/>
+          <a:p>
+            <a:pPr lvl="0" indent="0" marL="0">
+              <a:buNone/>
+            </a:pPr>
+            <a:r>
+              <a:rPr/>
+              <a:t>Screening Multivariate Data</a:t>
+            </a:r>
+          </a:p>
+        </p:txBody>
+      </p:sp>
+      <p:sp>
+        <p:nvSpPr>
+          <p:cNvPr id="3" name="Content Placeholder 2"/>
+          <p:cNvSpPr>
+            <a:spLocks noGrp="1"/>
+          </p:cNvSpPr>
+          <p:nvPr>
+            <p:ph idx="1" sz="half"/>
+          </p:nvPr>
+        </p:nvSpPr>
+        <p:spPr/>
+        <p:txBody>
+          <a:bodyPr/>
+          <a:lstStyle/>
+          <a:p>
+            <a:pPr lvl="0" indent="0" marL="0">
+              <a:spcBef>
+                <a:spcPts val="3000"/>
+              </a:spcBef>
+              <a:buNone/>
+            </a:pPr>
+            <a:r>
+              <a:rPr b="1"/>
+              <a:t>Key Issues to Check</a:t>
+            </a:r>
+          </a:p>
+          <a:p>
+            <a:pPr lvl="0" indent="0" marL="0">
+              <a:buNone/>
+            </a:pPr>
+            <a:r>
+              <a:rPr b="1"/>
+              <a:t>Multivariate Outliers</a:t>
+            </a:r>
+            <a:r>
+              <a:rPr/>
+              <a:t>: - Objects with unusual patterns across variables - Detected with Mahalanobis distance (d²) - Test against χ² distribution with p df</a:t>
+            </a:r>
+          </a:p>
+          <a:p>
+            <a:pPr lvl="0" indent="0" marL="0">
+              <a:buNone/>
+            </a:pPr>
+            <a:r>
+              <a:rPr b="1"/>
+              <a:t>Missing Observations</a:t>
+            </a:r>
+            <a:r>
+              <a:rPr/>
+              <a:t>: - Common approaches: - Deletion: remove affected object or variable - Imputation: estimate missing values - Maximum likelihood methods - Multiple imputation</a:t>
+            </a:r>
+          </a:p>
+        </p:txBody>
+      </p:sp>
+      <p:pic>
+        <p:nvPicPr>
+          <p:cNvPr descr="17_01_lecture_powerpoint_files/figure-pptx/unnamed-chunk-8-1.png" id="0" name="Picture 1"/>
+          <p:cNvPicPr>
+            <a:picLocks noGrp="1" noChangeAspect="1"/>
+          </p:cNvPicPr>
+          <p:nvPr/>
+        </p:nvPicPr>
+        <p:blipFill>
+          <a:blip r:embed="rId2"/>
+          <a:stretch>
+            <a:fillRect/>
+          </a:stretch>
+        </p:blipFill>
+        <p:spPr bwMode="auto">
+          <a:xfrm>
+            <a:off x="6121400" y="812800"/>
+            <a:ext cx="2781300" cy="4165600"/>
+          </a:xfrm>
+          <a:prstGeom prst="rect">
+            <a:avLst/>
+          </a:prstGeom>
+          <a:noFill/>
+          <a:ln w="9525">
+            <a:noFill/>
+            <a:headEnd/>
+            <a:tailEnd/>
+          </a:ln>
+        </p:spPr>
+      </p:pic>
+    </p:spTree>
+  </p:cSld>
+</p:sld>
+</file>
+
+<file path=ppt/slides/slide15.xml><?xml version="1.0" encoding="utf-8"?>
+<p:sld xmlns:a="http://schemas.openxmlformats.org/drawingml/2006/main" xmlns:r="http://schemas.openxmlformats.org/officeDocument/2006/relationships" xmlns:p="http://schemas.openxmlformats.org/presentationml/2006/main">
+  <p:cSld>
+    <p:spTree>
+      <p:nvGrpSpPr>
+        <p:cNvPr id="1" name=""/>
+        <p:cNvGrpSpPr/>
+        <p:nvPr/>
+      </p:nvGrpSpPr>
+      <p:grpSpPr>
+        <a:xfrm>
+          <a:off x="0" y="0"/>
+          <a:ext cx="0" cy="0"/>
+          <a:chOff x="0" y="0"/>
+          <a:chExt cx="0" cy="0"/>
+        </a:xfrm>
+      </p:grpSpPr>
+      <p:sp>
+        <p:nvSpPr>
+          <p:cNvPr id="2" name="Title 1"/>
+          <p:cNvSpPr>
+            <a:spLocks noGrp="1"/>
+          </p:cNvSpPr>
+          <p:nvPr>
+            <p:ph type="title"/>
+          </p:nvPr>
+        </p:nvSpPr>
+        <p:spPr>
+          <a:xfrm>
+            <a:off x="0" y="0"/>
+            <a:ext cx="9144000" cy="602780"/>
+          </a:xfrm>
+          <a:solidFill>
+            <a:srgbClr val="70121D"/>
+          </a:solidFill>
+        </p:spPr>
+        <p:txBody>
+          <a:bodyPr/>
+          <a:lstStyle/>
+          <a:p>
+            <a:pPr lvl="0" indent="0" marL="0">
+              <a:buNone/>
+            </a:pPr>
+            <a:r>
+              <a:rPr/>
+              <a:t>MANOVA (Multivariate Analysis of Variance)</a:t>
+            </a:r>
+          </a:p>
+        </p:txBody>
+      </p:sp>
+      <p:sp>
+        <p:nvSpPr>
+          <p:cNvPr id="3" name="Content Placeholder 2"/>
+          <p:cNvSpPr>
+            <a:spLocks noGrp="1"/>
+          </p:cNvSpPr>
+          <p:nvPr>
+            <p:ph idx="1" sz="half"/>
+          </p:nvPr>
+        </p:nvSpPr>
+        <p:spPr/>
+        <p:txBody>
+          <a:bodyPr/>
+          <a:lstStyle/>
+          <a:p>
+            <a:pPr lvl="0"/>
+            <a:r>
+              <a:rPr/>
+              <a:t>Multivariate extension of ANOVA</a:t>
+            </a:r>
+          </a:p>
+          <a:p>
+            <a:pPr lvl="0"/>
+            <a:r>
+              <a:rPr/>
+              <a:t>Tests for differences in group centroids based on multiple response variables</a:t>
+            </a:r>
+          </a:p>
+          <a:p>
+            <a:pPr lvl="0"/>
+            <a:r>
+              <a:rPr/>
+              <a:t>Advantages over multiple ANOVAs:</a:t>
+            </a:r>
+          </a:p>
+          <a:p>
+            <a:pPr lvl="1"/>
+            <a:r>
+              <a:rPr/>
+              <a:t>Controls family-wise error rate</a:t>
+            </a:r>
+          </a:p>
+          <a:p>
+            <a:pPr lvl="1"/>
+            <a:r>
+              <a:rPr/>
+              <a:t>Accounts for correlations between variables</a:t>
+            </a:r>
+          </a:p>
+          <a:p>
+            <a:pPr lvl="1"/>
+            <a:r>
+              <a:rPr/>
+              <a:t>More powerful when variables are correlated</a:t>
+            </a:r>
+          </a:p>
+          <a:p>
+            <a:pPr lvl="0"/>
+            <a:r>
+              <a:rPr/>
+              <a:t>Common test statistics:</a:t>
+            </a:r>
+          </a:p>
+          <a:p>
+            <a:pPr lvl="1"/>
+            <a:r>
+              <a:rPr/>
+              <a:t>Wilk’s lambda (λ)</a:t>
+            </a:r>
+          </a:p>
+          <a:p>
+            <a:pPr lvl="1"/>
+            <a:r>
+              <a:rPr/>
+              <a:t>Pillai’s trace</a:t>
+            </a:r>
+          </a:p>
+          <a:p>
+            <a:pPr lvl="1"/>
+            <a:r>
+              <a:rPr/>
+              <a:t>Hotelling-Lawley trace</a:t>
+            </a:r>
+          </a:p>
+        </p:txBody>
+      </p:sp>
+      <p:pic>
+        <p:nvPicPr>
+          <p:cNvPr descr="17_01_lecture_powerpoint_files/figure-pptx/unnamed-chunk-9-1.png" id="0" name="Picture 1"/>
+          <p:cNvPicPr>
+            <a:picLocks noGrp="1" noChangeAspect="1"/>
+          </p:cNvPicPr>
+          <p:nvPr/>
+        </p:nvPicPr>
+        <p:blipFill>
+          <a:blip r:embed="rId2"/>
+          <a:stretch>
+            <a:fillRect/>
+          </a:stretch>
+        </p:blipFill>
+        <p:spPr bwMode="auto">
+          <a:xfrm>
+            <a:off x="6121400" y="812800"/>
+            <a:ext cx="2781300" cy="4165600"/>
+          </a:xfrm>
+          <a:prstGeom prst="rect">
+            <a:avLst/>
+          </a:prstGeom>
+          <a:noFill/>
+          <a:ln w="9525">
+            <a:noFill/>
+            <a:headEnd/>
+            <a:tailEnd/>
+          </a:ln>
+        </p:spPr>
+      </p:pic>
+    </p:spTree>
+  </p:cSld>
+</p:sld>
+</file>
+
+<file path=ppt/slides/slide16.xml><?xml version="1.0" encoding="utf-8"?>
+<p:sld xmlns:a="http://schemas.openxmlformats.org/drawingml/2006/main" xmlns:r="http://schemas.openxmlformats.org/officeDocument/2006/relationships" xmlns:p="http://schemas.openxmlformats.org/presentationml/2006/main">
+  <p:cSld>
+    <p:spTree>
+      <p:nvGrpSpPr>
+        <p:cNvPr id="1" name=""/>
+        <p:cNvGrpSpPr/>
+        <p:nvPr/>
+      </p:nvGrpSpPr>
+      <p:grpSpPr>
+        <a:xfrm>
+          <a:off x="0" y="0"/>
+          <a:ext cx="0" cy="0"/>
+          <a:chOff x="0" y="0"/>
+          <a:chExt cx="0" cy="0"/>
+        </a:xfrm>
+      </p:grpSpPr>
+      <p:sp>
+        <p:nvSpPr>
+          <p:cNvPr id="3" name="Content Placeholder 2"/>
+          <p:cNvSpPr>
+            <a:spLocks noGrp="1"/>
+          </p:cNvSpPr>
+          <p:nvPr>
+            <p:ph idx="1"/>
+          </p:nvPr>
+        </p:nvSpPr>
+        <p:spPr/>
+        <p:txBody>
+          <a:bodyPr/>
+          <a:lstStyle/>
+          <a:p>
+            <a:pPr lvl="0" indent="0" marL="1270000">
+              <a:buNone/>
+            </a:pPr>
+            <a:r>
+              <a:rPr sz="2000" b="1"/>
+              <a:t>MANOVA Assumptions</a:t>
+            </a:r>
+          </a:p>
+          <a:p>
+            <a:pPr lvl="0"/>
+            <a:r>
+              <a:rPr sz="2000"/>
+              <a:t>Multivariate normality</a:t>
+            </a:r>
+          </a:p>
+          <a:p>
+            <a:pPr lvl="0"/>
+            <a:r>
+              <a:rPr sz="2000"/>
+              <a:t>Homogeneity of variance-covariance matrices</a:t>
+            </a:r>
+          </a:p>
+          <a:p>
+            <a:pPr lvl="0"/>
+            <a:r>
+              <a:rPr sz="2000"/>
+              <a:t>No extreme multivariate outliers</a:t>
+            </a:r>
+          </a:p>
+          <a:p>
+            <a:pPr lvl="0"/>
+            <a:r>
+              <a:rPr sz="2000"/>
+              <a:t>Independence of observations</a:t>
+            </a:r>
+          </a:p>
+        </p:txBody>
+      </p:sp>
+    </p:spTree>
+  </p:cSld>
+</p:sld>
+</file>
+
+<file path=ppt/slides/slide17.xml><?xml version="1.0" encoding="utf-8"?>
+<p:sld xmlns:a="http://schemas.openxmlformats.org/drawingml/2006/main" xmlns:r="http://schemas.openxmlformats.org/officeDocument/2006/relationships" xmlns:p="http://schemas.openxmlformats.org/presentationml/2006/main">
+  <p:cSld>
+    <p:spTree>
+      <p:nvGrpSpPr>
+        <p:cNvPr id="1" name=""/>
+        <p:cNvGrpSpPr/>
+        <p:nvPr/>
+      </p:nvGrpSpPr>
+      <p:grpSpPr>
+        <a:xfrm>
+          <a:off x="0" y="0"/>
+          <a:ext cx="0" cy="0"/>
+          <a:chOff x="0" y="0"/>
+          <a:chExt cx="0" cy="0"/>
+        </a:xfrm>
+      </p:grpSpPr>
+      <p:sp>
+        <p:nvSpPr>
+          <p:cNvPr id="2" name="Title 1"/>
+          <p:cNvSpPr>
+            <a:spLocks noGrp="1"/>
+          </p:cNvSpPr>
+          <p:nvPr>
+            <p:ph type="title"/>
+          </p:nvPr>
+        </p:nvSpPr>
+        <p:spPr>
+          <a:xfrm>
+            <a:off x="0" y="0"/>
+            <a:ext cx="9144000" cy="602780"/>
+          </a:xfrm>
+          <a:solidFill>
+            <a:srgbClr val="70121D"/>
+          </a:solidFill>
+        </p:spPr>
+        <p:txBody>
+          <a:bodyPr/>
+          <a:lstStyle/>
+          <a:p>
+            <a:pPr lvl="0" indent="0" marL="0">
+              <a:buNone/>
+            </a:pPr>
+            <a:r>
+              <a:rPr/>
+              <a:t>Discriminant Function Analysis</a:t>
+            </a:r>
+          </a:p>
+        </p:txBody>
+      </p:sp>
+      <p:sp>
+        <p:nvSpPr>
+          <p:cNvPr id="3" name="Content Placeholder 2"/>
+          <p:cNvSpPr>
+            <a:spLocks noGrp="1"/>
+          </p:cNvSpPr>
+          <p:nvPr>
+            <p:ph idx="1" sz="half"/>
+          </p:nvPr>
+        </p:nvSpPr>
+        <p:spPr/>
+        <p:txBody>
+          <a:bodyPr/>
+          <a:lstStyle/>
+          <a:p>
+            <a:pPr lvl="0"/>
+            <a:r>
+              <a:rPr/>
+              <a:t>Mathematically similar to MANOVA</a:t>
+            </a:r>
+          </a:p>
+          <a:p>
+            <a:pPr lvl="0"/>
+            <a:r>
+              <a:rPr/>
+              <a:t>Used for:</a:t>
+            </a:r>
+          </a:p>
+          <a:p>
+            <a:pPr lvl="1"/>
+            <a:r>
+              <a:rPr/>
+              <a:t>Testing differences between groups (like MANOVA)</a:t>
+            </a:r>
+          </a:p>
+          <a:p>
+            <a:pPr lvl="1"/>
+            <a:r>
+              <a:rPr/>
+              <a:t>Identifying variables that separate groups</a:t>
+            </a:r>
+          </a:p>
+          <a:p>
+            <a:pPr lvl="1"/>
+            <a:r>
+              <a:rPr/>
+              <a:t>Classifying observations into groups</a:t>
+            </a:r>
+          </a:p>
+          <a:p>
+            <a:pPr lvl="0"/>
+            <a:r>
+              <a:rPr/>
+              <a:t>Creates linear combinations (discriminant functions) that maximize between-group differences</a:t>
+            </a:r>
+          </a:p>
+          <a:p>
+            <a:pPr lvl="0"/>
+            <a:r>
+              <a:rPr/>
+              <a:t>Can assess how well classification performs</a:t>
+            </a:r>
+          </a:p>
+          <a:p>
+            <a:pPr lvl="0"/>
+            <a:r>
+              <a:rPr/>
+              <a:t>Jackknifed classification provides more realistic success rates</a:t>
+            </a:r>
+          </a:p>
+        </p:txBody>
+      </p:sp>
+      <p:pic>
+        <p:nvPicPr>
+          <p:cNvPr descr="17_01_lecture_powerpoint_files/figure-pptx/unnamed-chunk-10-1.png" id="0" name="Picture 1"/>
+          <p:cNvPicPr>
+            <a:picLocks noGrp="1" noChangeAspect="1"/>
+          </p:cNvPicPr>
+          <p:nvPr/>
+        </p:nvPicPr>
+        <p:blipFill>
+          <a:blip r:embed="rId2"/>
+          <a:stretch>
+            <a:fillRect/>
+          </a:stretch>
+        </p:blipFill>
+        <p:spPr bwMode="auto">
+          <a:xfrm>
+            <a:off x="6121400" y="812800"/>
+            <a:ext cx="2781300" cy="4165600"/>
+          </a:xfrm>
+          <a:prstGeom prst="rect">
+            <a:avLst/>
+          </a:prstGeom>
+          <a:noFill/>
+          <a:ln w="9525">
+            <a:noFill/>
+            <a:headEnd/>
+            <a:tailEnd/>
+          </a:ln>
+        </p:spPr>
+      </p:pic>
+    </p:spTree>
+  </p:cSld>
+</p:sld>
+</file>
+
+<file path=ppt/slides/slide18.xml><?xml version="1.0" encoding="utf-8"?>
+<p:sld xmlns:a="http://schemas.openxmlformats.org/drawingml/2006/main" xmlns:r="http://schemas.openxmlformats.org/officeDocument/2006/relationships" xmlns:p="http://schemas.openxmlformats.org/presentationml/2006/main">
+  <p:cSld>
+    <p:spTree>
+      <p:nvGrpSpPr>
+        <p:cNvPr id="1" name=""/>
+        <p:cNvGrpSpPr/>
+        <p:nvPr/>
+      </p:nvGrpSpPr>
+      <p:grpSpPr>
+        <a:xfrm>
+          <a:off x="0" y="0"/>
+          <a:ext cx="0" cy="0"/>
+          <a:chOff x="0" y="0"/>
+          <a:chExt cx="0" cy="0"/>
+        </a:xfrm>
+      </p:grpSpPr>
+      <p:sp>
+        <p:nvSpPr>
+          <p:cNvPr id="2" name="Title 1"/>
+          <p:cNvSpPr>
+            <a:spLocks noGrp="1"/>
+          </p:cNvSpPr>
+          <p:nvPr>
+            <p:ph type="title"/>
+          </p:nvPr>
+        </p:nvSpPr>
+        <p:spPr>
+          <a:xfrm>
+            <a:off x="0" y="0"/>
+            <a:ext cx="9144000" cy="602780"/>
+          </a:xfrm>
+          <a:solidFill>
+            <a:srgbClr val="70121D"/>
+          </a:solidFill>
+        </p:spPr>
+        <p:txBody>
+          <a:bodyPr/>
+          <a:lstStyle/>
+          <a:p>
+            <a:pPr lvl="0" indent="0" marL="0">
+              <a:buNone/>
+            </a:pPr>
+            <a:r>
+              <a:rPr/>
+              <a:t>Summary</a:t>
+            </a:r>
+          </a:p>
+        </p:txBody>
+      </p:sp>
+      <p:sp>
+        <p:nvSpPr>
+          <p:cNvPr id="3" name="Content Placeholder 2"/>
+          <p:cNvSpPr>
+            <a:spLocks noGrp="1"/>
+          </p:cNvSpPr>
+          <p:nvPr>
+            <p:ph idx="1" sz="half"/>
+          </p:nvPr>
+        </p:nvSpPr>
+        <p:spPr/>
+        <p:txBody>
+          <a:bodyPr/>
+          <a:lstStyle/>
+          <a:p>
+            <a:pPr lvl="0" indent="0" marL="0">
+              <a:spcBef>
+                <a:spcPts val="3000"/>
+              </a:spcBef>
+              <a:buNone/>
+            </a:pPr>
+            <a:r>
+              <a:rPr b="1"/>
+              <a:t>Key Concepts</a:t>
+            </a:r>
+          </a:p>
+          <a:p>
+            <a:pPr lvl="0" indent="-342900" marL="342900">
+              <a:buAutoNum type="arabicPeriod"/>
+            </a:pPr>
+            <a:r>
+              <a:rPr b="1"/>
+              <a:t>Multivariate data</a:t>
+            </a:r>
+            <a:r>
+              <a:rPr/>
+              <a:t> requires special techniques to account for correlations between variables</a:t>
+            </a:r>
+          </a:p>
+          <a:p>
+            <a:pPr lvl="0" indent="-342900" marL="342900">
+              <a:buAutoNum type="arabicPeriod"/>
+            </a:pPr>
+            <a:r>
+              <a:rPr b="1"/>
+              <a:t>Functional methods</a:t>
+            </a:r>
+            <a:r>
+              <a:rPr/>
+              <a:t> (MANOVA) test hypotheses about group differences</a:t>
+            </a:r>
+          </a:p>
+          <a:p>
+            <a:pPr lvl="0" indent="-342900" marL="342900">
+              <a:buAutoNum type="arabicPeriod"/>
+            </a:pPr>
+            <a:r>
+              <a:rPr b="1"/>
+              <a:t>Structural methods</a:t>
+            </a:r>
+            <a:r>
+              <a:rPr/>
+              <a:t> (PCA, NMDS) find patterns in data</a:t>
+            </a:r>
+          </a:p>
+          <a:p>
+            <a:pPr lvl="0" indent="-342900" marL="342900">
+              <a:buAutoNum type="arabicPeriod"/>
+            </a:pPr>
+            <a:r>
+              <a:rPr b="1"/>
+              <a:t>Distance measures</a:t>
+            </a:r>
+            <a:r>
+              <a:rPr/>
+              <a:t> quantify similarities between objects</a:t>
+            </a:r>
+          </a:p>
+          <a:p>
+            <a:pPr lvl="0" indent="-342900" marL="342900">
+              <a:buAutoNum type="arabicPeriod"/>
+            </a:pPr>
+            <a:r>
+              <a:rPr b="1"/>
+              <a:t>Data standardization</a:t>
+            </a:r>
+            <a:r>
+              <a:rPr/>
+              <a:t> is crucial for variables with different units</a:t>
+            </a:r>
+          </a:p>
+          <a:p>
+            <a:pPr lvl="0" indent="-342900" marL="342900">
+              <a:buAutoNum type="arabicPeriod"/>
+            </a:pPr>
+            <a:r>
+              <a:rPr b="1"/>
+              <a:t>Multivariate graphics</a:t>
+            </a:r>
+            <a:r>
+              <a:rPr/>
+              <a:t> help visualize complex relationships</a:t>
+            </a:r>
+          </a:p>
+        </p:txBody>
+      </p:sp>
+      <p:pic>
+        <p:nvPicPr>
+          <p:cNvPr descr="17_01_lecture_powerpoint_files/figure-pptx/unnamed-chunk-11-1.png" id="0" name="Picture 1"/>
+          <p:cNvPicPr>
+            <a:picLocks noGrp="1" noChangeAspect="1"/>
+          </p:cNvPicPr>
+          <p:nvPr/>
+        </p:nvPicPr>
+        <p:blipFill>
+          <a:blip r:embed="rId2"/>
+          <a:stretch>
+            <a:fillRect/>
+          </a:stretch>
+        </p:blipFill>
+        <p:spPr bwMode="auto">
+          <a:xfrm>
+            <a:off x="6121400" y="812800"/>
+            <a:ext cx="2781300" cy="4165600"/>
+          </a:xfrm>
+          <a:prstGeom prst="rect">
+            <a:avLst/>
+          </a:prstGeom>
+          <a:noFill/>
+          <a:ln w="9525">
+            <a:noFill/>
+            <a:headEnd/>
+            <a:tailEnd/>
+          </a:ln>
+        </p:spPr>
+      </p:pic>
     </p:spTree>
   </p:cSld>
 </p:sld>
@@ -3358,92 +4649,6 @@
           <a:chExt cx="0" cy="0"/>
         </a:xfrm>
       </p:grpSpPr>
-      <p:sp>
-        <p:nvSpPr>
-          <p:cNvPr id="2" name="Title 1"/>
-          <p:cNvSpPr>
-            <a:spLocks noGrp="1"/>
-          </p:cNvSpPr>
-          <p:nvPr>
-            <p:ph type="title"/>
-          </p:nvPr>
-        </p:nvSpPr>
-        <p:spPr>
-          <a:xfrm>
-            <a:off x="0" y="0"/>
-            <a:ext cx="9144000" cy="602780"/>
-          </a:xfrm>
-          <a:solidFill>
-            <a:srgbClr val="70121D"/>
-          </a:solidFill>
-        </p:spPr>
-        <p:txBody>
-          <a:bodyPr/>
-          <a:lstStyle/>
-          <a:p>
-            <a:pPr lvl="0" indent="0" marL="0">
-              <a:buNone/>
-            </a:pPr>
-            <a:r>
-              <a:rPr/>
-              <a:t>Lecture 16: Review</a:t>
-            </a:r>
-          </a:p>
-        </p:txBody>
-      </p:sp>
-      <p:sp>
-        <p:nvSpPr>
-          <p:cNvPr id="3" name="Content Placeholder 2"/>
-          <p:cNvSpPr>
-            <a:spLocks noGrp="1"/>
-          </p:cNvSpPr>
-          <p:nvPr>
-            <p:ph idx="1" sz="half"/>
-          </p:nvPr>
-        </p:nvSpPr>
-        <p:spPr/>
-        <p:txBody>
-          <a:bodyPr/>
-          <a:lstStyle/>
-          <a:p>
-            <a:pPr lvl="0" indent="0" marL="0">
-              <a:spcBef>
-                <a:spcPts val="3000"/>
-              </a:spcBef>
-              <a:buNone/>
-            </a:pPr>
-            <a:r>
-              <a:rPr b="1"/>
-              <a:t>Review</a:t>
-            </a:r>
-          </a:p>
-        </p:txBody>
-      </p:sp>
-      <p:sp>
-        <p:nvSpPr>
-          <p:cNvPr id="4" name="Content Placeholder 3"/>
-          <p:cNvSpPr>
-            <a:spLocks noGrp="1"/>
-          </p:cNvSpPr>
-          <p:nvPr>
-            <p:ph idx="2" sz="half"/>
-          </p:nvPr>
-        </p:nvSpPr>
-        <p:spPr/>
-        <p:txBody>
-          <a:bodyPr/>
-          <a:lstStyle/>
-          <a:p>
-            <a:pPr lvl="0" indent="0" marL="0">
-              <a:buNone/>
-            </a:pPr>
-            <a:r>
-              <a:rPr/>
-              <a:t>image</a:t>
-            </a:r>
-          </a:p>
-        </p:txBody>
-      </p:sp>
     </p:spTree>
   </p:cSld>
 </p:sld>
@@ -3479,8 +4684,11 @@
         <p:spPr>
           <a:xfrm>
             <a:off x="0" y="0"/>
-            <a:ext cx="9144000" cy="582780"/>
+            <a:ext cx="9144000" cy="602780"/>
           </a:xfrm>
+          <a:solidFill>
+            <a:srgbClr val="70121D"/>
+          </a:solidFill>
         </p:spPr>
         <p:txBody>
           <a:bodyPr/>
@@ -3491,7 +4699,7 @@
             </a:pPr>
             <a:r>
               <a:rPr/>
-              <a:t>Lecture 17: Overview</a:t>
+              <a:t>Introduction to Multivariate Statistics</a:t>
             </a:r>
           </a:p>
         </p:txBody>
@@ -3503,7 +4711,7 @@
             <a:spLocks noGrp="1"/>
           </p:cNvSpPr>
           <p:nvPr>
-            <p:ph idx="1"/>
+            <p:ph idx="1" sz="half"/>
           </p:nvPr>
         </p:nvSpPr>
         <p:spPr/>
@@ -3523,19 +4731,66 @@
             </a:r>
           </a:p>
           <a:p>
-            <a:pPr lvl="0" indent="0" marL="0">
-              <a:buNone/>
-            </a:pPr>
-            <a:r>
-              <a:rPr/>
-              <a:t>Analysis of variance:</a:t>
-            </a:r>
-          </a:p>
-          <a:p>
             <a:pPr lvl="0"/>
             <a:r>
               <a:rPr/>
-              <a:t>Examples:</a:t>
+              <a:t>Multivariate data: multiple variables per object</a:t>
+            </a:r>
+          </a:p>
+          <a:p>
+            <a:pPr lvl="0"/>
+            <a:r>
+              <a:rPr/>
+              <a:t>Types of multivariate analyses</a:t>
+            </a:r>
+          </a:p>
+          <a:p>
+            <a:pPr lvl="1"/>
+            <a:r>
+              <a:rPr/>
+              <a:t>Functional vs. structural methods</a:t>
+            </a:r>
+          </a:p>
+          <a:p>
+            <a:pPr lvl="1"/>
+            <a:r>
+              <a:rPr/>
+              <a:t>R-mode vs. Q-mode analyses</a:t>
+            </a:r>
+          </a:p>
+          <a:p>
+            <a:pPr lvl="0"/>
+            <a:r>
+              <a:rPr/>
+              <a:t>Eigenvectors, eigenvalues, and components</a:t>
+            </a:r>
+          </a:p>
+          <a:p>
+            <a:pPr lvl="0"/>
+            <a:r>
+              <a:rPr/>
+              <a:t>Distance and dissimilarity measures</a:t>
+            </a:r>
+          </a:p>
+          <a:p>
+            <a:pPr lvl="0"/>
+            <a:r>
+              <a:rPr/>
+              <a:t>Data transformations and standardization</a:t>
+            </a:r>
+          </a:p>
+          <a:p>
+            <a:pPr lvl="0"/>
+            <a:r>
+              <a:rPr/>
+              <a:t>Screening multivariate data</a:t>
+            </a:r>
+          </a:p>
+          <a:p>
+            <a:pPr lvl="0"/>
+            <a:r>
+              <a:rPr/>
+              <a:t>MANOVA</a:t>
             </a:r>
           </a:p>
         </p:txBody>
@@ -3589,12 +4844,8 @@
               <a:buNone/>
             </a:pPr>
             <a:r>
-              <a:rPr b="1"/>
-              <a:t>Lecture 17:</a:t>
-            </a:r>
-            <a:r>
-              <a:rPr/>
-              <a:t> ANOVA</a:t>
+              <a:rPr/>
+              <a:t>Multivariate Data</a:t>
             </a:r>
           </a:p>
         </p:txBody>
@@ -3614,16 +4865,86 @@
           <a:bodyPr/>
           <a:lstStyle/>
           <a:p>
-            <a:pPr lvl="0" indent="0" marL="0">
-              <a:buNone/>
-            </a:pPr>
-            <a:r>
-              <a:rPr/>
-              <a:t>text</a:t>
-            </a:r>
-          </a:p>
-        </p:txBody>
-      </p:sp>
+            <a:pPr lvl="0"/>
+            <a:r>
+              <a:rPr/>
+              <a:t>Multiple variables recorded about each object (individual, quadrat, site, etc.)</a:t>
+            </a:r>
+          </a:p>
+          <a:p>
+            <a:pPr lvl="0"/>
+            <a:r>
+              <a:rPr/>
+              <a:t>Objects: rows (i = 1 to n)</a:t>
+            </a:r>
+          </a:p>
+          <a:p>
+            <a:pPr lvl="0"/>
+            <a:r>
+              <a:rPr/>
+              <a:t>Variables: columns (j = 1 to p)</a:t>
+            </a:r>
+          </a:p>
+          <a:p>
+            <a:pPr lvl="0"/>
+            <a:r>
+              <a:rPr/>
+              <a:t>Examples:</a:t>
+            </a:r>
+          </a:p>
+          <a:p>
+            <a:pPr lvl="1"/>
+            <a:r>
+              <a:rPr/>
+              <a:t>Stream sites with multiple chemical parameters</a:t>
+            </a:r>
+          </a:p>
+          <a:p>
+            <a:pPr lvl="1"/>
+            <a:r>
+              <a:rPr/>
+              <a:t>Species with multiple morphological traits</a:t>
+            </a:r>
+          </a:p>
+          <a:p>
+            <a:pPr lvl="1"/>
+            <a:r>
+              <a:rPr/>
+              <a:t>Sample units with multiple species abundances</a:t>
+            </a:r>
+          </a:p>
+        </p:txBody>
+      </p:sp>
+      <p:pic>
+        <p:nvPicPr>
+          <p:cNvPr descr="17_01_lecture_powerpoint_files/figure-pptx/unnamed-chunk-1-1.png" id="0" name="Picture 1"/>
+          <p:cNvPicPr>
+            <a:picLocks noGrp="1" noChangeAspect="1"/>
+          </p:cNvPicPr>
+          <p:nvPr/>
+        </p:nvPicPr>
+        <p:blipFill>
+          <a:blip r:embed="rId2"/>
+          <a:stretch>
+            <a:fillRect/>
+          </a:stretch>
+        </p:blipFill>
+        <p:spPr bwMode="auto">
+          <a:xfrm>
+            <a:off x="6121400" y="812800"/>
+            <a:ext cx="2781300" cy="4165600"/>
+          </a:xfrm>
+          <a:prstGeom prst="rect">
+            <a:avLst/>
+          </a:prstGeom>
+          <a:noFill/>
+          <a:ln w="9525">
+            <a:noFill/>
+            <a:headEnd/>
+            <a:tailEnd/>
+          </a:ln>
+        </p:spPr>
+      </p:pic>
     </p:spTree>
   </p:cSld>
 </p:sld>
@@ -3666,7 +4987,7 @@
             </a:pPr>
             <a:r>
               <a:rPr sz="2000" b="1"/>
-              <a:t>Callout</a:t>
+              <a:t>Multivariate data vs. multivariate analysis</a:t>
             </a:r>
           </a:p>
           <a:p>
@@ -3675,7 +4996,7 @@
             </a:pPr>
             <a:r>
               <a:rPr sz="2000"/>
-              <a:t>more text</a:t>
+              <a:t>We’ve already seen multivariate data in multiple regression and multi-factor ANOVA, but now we’ll look at cases with multiple response variables.</a:t>
             </a:r>
           </a:p>
         </p:txBody>
@@ -3715,8 +5036,11 @@
         <p:spPr>
           <a:xfrm>
             <a:off x="0" y="0"/>
-            <a:ext cx="9144000" cy="582780"/>
+            <a:ext cx="9144000" cy="602780"/>
           </a:xfrm>
+          <a:solidFill>
+            <a:srgbClr val="70121D"/>
+          </a:solidFill>
         </p:spPr>
         <p:txBody>
           <a:bodyPr/>
@@ -3726,37 +5050,49 @@
               <a:buNone/>
             </a:pPr>
             <a:r>
+              <a:rPr/>
+              <a:t>Multivariate Statistics in Ecology</a:t>
+            </a:r>
+          </a:p>
+        </p:txBody>
+      </p:sp>
+      <p:sp>
+        <p:nvSpPr>
+          <p:cNvPr id="3" name="Content Placeholder 2"/>
+          <p:cNvSpPr>
+            <a:spLocks noGrp="1"/>
+          </p:cNvSpPr>
+          <p:nvPr>
+            <p:ph idx="1" sz="half"/>
+          </p:nvPr>
+        </p:nvSpPr>
+        <p:spPr/>
+        <p:txBody>
+          <a:bodyPr/>
+          <a:lstStyle/>
+          <a:p>
+            <a:pPr lvl="0" indent="0" marL="0">
+              <a:spcBef>
+                <a:spcPts val="3000"/>
+              </a:spcBef>
+              <a:buNone/>
+            </a:pPr>
+            <a:r>
               <a:rPr b="1"/>
-              <a:t>Lecture 17:</a:t>
-            </a:r>
-            <a:r>
-              <a:rPr/>
-              <a:t> Reporting results</a:t>
-            </a:r>
-          </a:p>
-        </p:txBody>
-      </p:sp>
-      <p:sp>
-        <p:nvSpPr>
-          <p:cNvPr id="3" name="Content Placeholder 2"/>
-          <p:cNvSpPr>
-            <a:spLocks noGrp="1"/>
-          </p:cNvSpPr>
-          <p:nvPr>
-            <p:ph idx="1"/>
-          </p:nvPr>
-        </p:nvSpPr>
-        <p:spPr/>
-        <p:txBody>
-          <a:bodyPr/>
-          <a:lstStyle/>
+              <a:t>Functional vs. Structural Methods</a:t>
+            </a:r>
+          </a:p>
           <a:p>
             <a:pPr lvl="0" indent="0" marL="0">
               <a:buNone/>
             </a:pPr>
             <a:r>
               <a:rPr b="1"/>
-              <a:t>Formal scientific writing example:</a:t>
+              <a:t>Functional methods</a:t>
+            </a:r>
+            <a:r>
+              <a:rPr/>
+              <a:t>: - Clear response and predictor variables - Goal: relate Y’s to X’s - Examples: MANOVA, PERMANOVA</a:t>
             </a:r>
           </a:p>
           <a:p>
@@ -3764,12 +5100,46 @@
               <a:buNone/>
             </a:pPr>
             <a:r>
-              <a:rPr/>
-              <a:t>“what would you write up”</a:t>
-            </a:r>
-          </a:p>
-        </p:txBody>
-      </p:sp>
+              <a:rPr b="1"/>
+              <a:t>Structural methods</a:t>
+            </a:r>
+            <a:r>
+              <a:rPr/>
+              <a:t>: - Find patterns/structure in data - Often no clear predictors - Examples: PCA, NMDS, Cluster Analysis</a:t>
+            </a:r>
+          </a:p>
+        </p:txBody>
+      </p:sp>
+      <p:pic>
+        <p:nvPicPr>
+          <p:cNvPr descr="17_01_lecture_powerpoint_files/figure-pptx/unnamed-chunk-2-1.png" id="0" name="Picture 1"/>
+          <p:cNvPicPr>
+            <a:picLocks noGrp="1" noChangeAspect="1"/>
+          </p:cNvPicPr>
+          <p:nvPr/>
+        </p:nvPicPr>
+        <p:blipFill>
+          <a:blip r:embed="rId2"/>
+          <a:stretch>
+            <a:fillRect/>
+          </a:stretch>
+        </p:blipFill>
+        <p:spPr bwMode="auto">
+          <a:xfrm>
+            <a:off x="6121400" y="812800"/>
+            <a:ext cx="2781300" cy="4165600"/>
+          </a:xfrm>
+          <a:prstGeom prst="rect">
+            <a:avLst/>
+          </a:prstGeom>
+          <a:noFill/>
+          <a:ln w="9525">
+            <a:noFill/>
+            <a:headEnd/>
+            <a:tailEnd/>
+          </a:ln>
+        </p:spPr>
+      </p:pic>
     </p:spTree>
   </p:cSld>
 </p:sld>
@@ -3805,8 +5175,11 @@
         <p:spPr>
           <a:xfrm>
             <a:off x="0" y="0"/>
-            <a:ext cx="9144000" cy="582780"/>
+            <a:ext cx="9144000" cy="602780"/>
           </a:xfrm>
+          <a:solidFill>
+            <a:srgbClr val="70121D"/>
+          </a:solidFill>
         </p:spPr>
         <p:txBody>
           <a:bodyPr/>
@@ -3816,12 +5189,8 @@
               <a:buNone/>
             </a:pPr>
             <a:r>
-              <a:rPr b="1"/>
-              <a:t>Lecture 17:</a:t>
-            </a:r>
-            <a:r>
-              <a:rPr/>
-              <a:t> Summary</a:t>
+              <a:rPr/>
+              <a:t>Structural Methods in Multivariate Analysis</a:t>
             </a:r>
           </a:p>
         </p:txBody>
@@ -3833,7 +5202,7 @@
             <a:spLocks noGrp="1"/>
           </p:cNvSpPr>
           <p:nvPr>
-            <p:ph idx="1"/>
+            <p:ph idx="1" sz="half"/>
           </p:nvPr>
         </p:nvSpPr>
         <p:spPr/>
@@ -3849,84 +5218,276 @@
             </a:pPr>
             <a:r>
               <a:rPr b="1"/>
-              <a:t>Key Principles</a:t>
-            </a:r>
-          </a:p>
-          <a:p>
-            <a:pPr lvl="0" indent="-342900" marL="342900">
-              <a:buAutoNum type="arabicPeriod"/>
+              <a:t>Two Main Approaches</a:t>
+            </a:r>
+          </a:p>
+          <a:p>
+            <a:pPr lvl="0" indent="0" marL="0">
+              <a:buNone/>
             </a:pPr>
             <a:r>
               <a:rPr b="1"/>
-              <a:t>Purpose</a:t>
-            </a:r>
-            <a:r>
-              <a:rPr/>
-              <a:t>:</a:t>
-            </a:r>
-          </a:p>
-          <a:p>
-            <a:pPr lvl="0" indent="-342900" marL="342900">
-              <a:buAutoNum type="arabicPeriod"/>
+              <a:t>Scaling/Ordination Methods</a:t>
+            </a:r>
+            <a:r>
+              <a:rPr/>
+              <a:t>: - Reduce dimensions with new derived variables - Summarize patterns in data - Examples: PCA, CCA</a:t>
+            </a:r>
+          </a:p>
+          <a:p>
+            <a:pPr lvl="0" indent="0" marL="0">
+              <a:buNone/>
             </a:pPr>
             <a:r>
               <a:rPr b="1"/>
-              <a:t>The Analysis</a:t>
+              <a:t>Dissimilarity-Based Methods</a:t>
+            </a:r>
+            <a:r>
+              <a:rPr/>
+              <a:t>: - Measure dissimilarity between objects - Visualize relationships between objects - Examples: NMDS, Cluster Analysis</a:t>
+            </a:r>
+          </a:p>
+        </p:txBody>
+      </p:sp>
+      <p:pic>
+        <p:nvPicPr>
+          <p:cNvPr descr="17_01_lecture_powerpoint_files/figure-pptx/unnamed-chunk-3-1.png" id="0" name="Picture 1"/>
+          <p:cNvPicPr>
+            <a:picLocks noGrp="1" noChangeAspect="1"/>
+          </p:cNvPicPr>
+          <p:nvPr/>
+        </p:nvPicPr>
+        <p:blipFill>
+          <a:blip r:embed="rId2"/>
+          <a:stretch>
+            <a:fillRect/>
+          </a:stretch>
+        </p:blipFill>
+        <p:spPr bwMode="auto">
+          <a:xfrm>
+            <a:off x="6121400" y="812800"/>
+            <a:ext cx="2781300" cy="4165600"/>
+          </a:xfrm>
+          <a:prstGeom prst="rect">
+            <a:avLst/>
+          </a:prstGeom>
+          <a:noFill/>
+          <a:ln w="9525">
+            <a:noFill/>
+            <a:headEnd/>
+            <a:tailEnd/>
+          </a:ln>
+        </p:spPr>
+      </p:pic>
+    </p:spTree>
+  </p:cSld>
+</p:sld>
+</file>
+
+<file path=ppt/slides/slide8.xml><?xml version="1.0" encoding="utf-8"?>
+<p:sld xmlns:a="http://schemas.openxmlformats.org/drawingml/2006/main" xmlns:r="http://schemas.openxmlformats.org/officeDocument/2006/relationships" xmlns:p="http://schemas.openxmlformats.org/presentationml/2006/main">
+  <p:cSld>
+    <p:spTree>
+      <p:nvGrpSpPr>
+        <p:cNvPr id="1" name=""/>
+        <p:cNvGrpSpPr/>
+        <p:nvPr/>
+      </p:nvGrpSpPr>
+      <p:grpSpPr>
+        <a:xfrm>
+          <a:off x="0" y="0"/>
+          <a:ext cx="0" cy="0"/>
+          <a:chOff x="0" y="0"/>
+          <a:chExt cx="0" cy="0"/>
+        </a:xfrm>
+      </p:grpSpPr>
+      <p:sp>
+        <p:nvSpPr>
+          <p:cNvPr id="2" name="Title 1"/>
+          <p:cNvSpPr>
+            <a:spLocks noGrp="1"/>
+          </p:cNvSpPr>
+          <p:nvPr>
+            <p:ph type="title"/>
+          </p:nvPr>
+        </p:nvSpPr>
+        <p:spPr>
+          <a:xfrm>
+            <a:off x="0" y="0"/>
+            <a:ext cx="9144000" cy="602780"/>
+          </a:xfrm>
+          <a:solidFill>
+            <a:srgbClr val="70121D"/>
+          </a:solidFill>
+        </p:spPr>
+        <p:txBody>
+          <a:bodyPr/>
+          <a:lstStyle/>
+          <a:p>
+            <a:pPr lvl="0" indent="0" marL="0">
+              <a:buNone/>
+            </a:pPr>
+            <a:r>
+              <a:rPr/>
+              <a:t>Eigenvectors, Eigenvalues, and Components</a:t>
+            </a:r>
+          </a:p>
+        </p:txBody>
+      </p:sp>
+      <p:sp>
+        <p:nvSpPr>
+          <p:cNvPr id="3" name="Content Placeholder 2"/>
+          <p:cNvSpPr>
+            <a:spLocks noGrp="1"/>
+          </p:cNvSpPr>
+          <p:nvPr>
+            <p:ph idx="1" sz="half"/>
+          </p:nvPr>
+        </p:nvSpPr>
+        <p:spPr/>
+        <p:txBody>
+          <a:bodyPr/>
+          <a:lstStyle/>
+          <a:p>
+            <a:pPr lvl="0"/>
+            <a:r>
+              <a:rPr/>
+              <a:t>Goal: derive new variables (principal components) that explain variation in data</a:t>
+            </a:r>
+          </a:p>
+          <a:p>
+            <a:pPr lvl="0"/>
+            <a:r>
+              <a:rPr/>
+              <a:t>Components are linear combinations of original variables:</a:t>
             </a:r>
           </a:p>
           <a:p>
             <a:pPr lvl="1"/>
             <a:r>
               <a:rPr/>
-              <a:t>asdf</a:t>
-            </a:r>
-          </a:p>
-          <a:p>
-            <a:pPr lvl="0" indent="-342900" marL="342900">
-              <a:buAutoNum type="arabicPeriod"/>
+              <a:t>zik = c1yi1 + c2yi2 + … + cpyip</a:t>
+            </a:r>
+          </a:p>
+          <a:p>
+            <a:pPr lvl="0"/>
+            <a:r>
+              <a:rPr/>
+              <a:t>Properties of derived variables:</a:t>
+            </a:r>
+          </a:p>
+          <a:p>
+            <a:pPr lvl="1"/>
+            <a:r>
+              <a:rPr/>
+              <a:t>First component explains most variation</a:t>
+            </a:r>
+          </a:p>
+          <a:p>
+            <a:pPr lvl="1"/>
+            <a:r>
+              <a:rPr/>
+              <a:t>Second explains most remaining variation</a:t>
+            </a:r>
+          </a:p>
+          <a:p>
+            <a:pPr lvl="1"/>
+            <a:r>
+              <a:rPr/>
+              <a:t>Components are uncorrelated with each other</a:t>
+            </a:r>
+          </a:p>
+          <a:p>
+            <a:pPr lvl="1"/>
+            <a:r>
+              <a:rPr/>
+              <a:t>As many components as original variables</a:t>
+            </a:r>
+          </a:p>
+        </p:txBody>
+      </p:sp>
+      <p:pic>
+        <p:nvPicPr>
+          <p:cNvPr descr="17_01_lecture_powerpoint_files/figure-pptx/unnamed-chunk-4-1.png" id="0" name="Picture 1"/>
+          <p:cNvPicPr>
+            <a:picLocks noGrp="1" noChangeAspect="1"/>
+          </p:cNvPicPr>
+          <p:nvPr/>
+        </p:nvPicPr>
+        <p:blipFill>
+          <a:blip r:embed="rId2"/>
+          <a:stretch>
+            <a:fillRect/>
+          </a:stretch>
+        </p:blipFill>
+        <p:spPr bwMode="auto">
+          <a:xfrm>
+            <a:off x="6121400" y="812800"/>
+            <a:ext cx="2781300" cy="4165600"/>
+          </a:xfrm>
+          <a:prstGeom prst="rect">
+            <a:avLst/>
+          </a:prstGeom>
+          <a:noFill/>
+          <a:ln w="9525">
+            <a:noFill/>
+            <a:headEnd/>
+            <a:tailEnd/>
+          </a:ln>
+        </p:spPr>
+      </p:pic>
+    </p:spTree>
+  </p:cSld>
+</p:sld>
+</file>
+
+<file path=ppt/slides/slide9.xml><?xml version="1.0" encoding="utf-8"?>
+<p:sld xmlns:a="http://schemas.openxmlformats.org/drawingml/2006/main" xmlns:r="http://schemas.openxmlformats.org/officeDocument/2006/relationships" xmlns:p="http://schemas.openxmlformats.org/presentationml/2006/main">
+  <p:cSld>
+    <p:spTree>
+      <p:nvGrpSpPr>
+        <p:cNvPr id="1" name=""/>
+        <p:cNvGrpSpPr/>
+        <p:nvPr/>
+      </p:nvGrpSpPr>
+      <p:grpSpPr>
+        <a:xfrm>
+          <a:off x="0" y="0"/>
+          <a:ext cx="0" cy="0"/>
+          <a:chOff x="0" y="0"/>
+          <a:chExt cx="0" cy="0"/>
+        </a:xfrm>
+      </p:grpSpPr>
+      <p:sp>
+        <p:nvSpPr>
+          <p:cNvPr id="3" name="Content Placeholder 2"/>
+          <p:cNvSpPr>
+            <a:spLocks noGrp="1"/>
+          </p:cNvSpPr>
+          <p:nvPr>
+            <p:ph idx="1"/>
+          </p:nvPr>
+        </p:nvSpPr>
+        <p:spPr/>
+        <p:txBody>
+          <a:bodyPr/>
+          <a:lstStyle/>
+          <a:p>
+            <a:pPr lvl="0" indent="0" marL="1270000">
+              <a:buNone/>
             </a:pPr>
             <a:r>
-              <a:rPr b="1"/>
-              <a:t>asdf</a:t>
-            </a:r>
-          </a:p>
-          <a:p>
-            <a:pPr lvl="0" indent="0" marL="0">
-              <a:spcBef>
-                <a:spcPts val="3000"/>
-              </a:spcBef>
+              <a:rPr sz="2000" b="1"/>
+              <a:t>Key concept</a:t>
+            </a:r>
+          </a:p>
+          <a:p>
+            <a:pPr lvl="0" indent="0" marL="1270000">
               <a:buNone/>
             </a:pPr>
             <a:r>
-              <a:rPr b="1"/>
-              <a:t>Assumptions</a:t>
-            </a:r>
-          </a:p>
-          <a:p>
-            <a:pPr lvl="0" indent="-342900" marL="342900">
-              <a:buAutoNum type="arabicPeriod"/>
-            </a:pPr>
-            <a:r>
-              <a:rPr/>
-              <a:t>Independence of observations</a:t>
-            </a:r>
-          </a:p>
-          <a:p>
-            <a:pPr lvl="0" indent="-342900" marL="342900">
-              <a:buAutoNum type="arabicPeriod"/>
-            </a:pPr>
-            <a:r>
-              <a:rPr/>
-              <a:t>Normal distribution of residuals</a:t>
-            </a:r>
-          </a:p>
-          <a:p>
-            <a:pPr lvl="0" indent="-342900" marL="342900">
-              <a:buAutoNum type="arabicPeriod"/>
-            </a:pPr>
-            <a:r>
-              <a:rPr/>
-              <a:t>Homogeneity of variances</a:t>
+              <a:rPr sz="2000"/>
+              <a:t>Eigenvalues (λ) represent the amount of variation explained by each new derived variable, while eigenvectors contain the coefficients showing how original variables contribute to each component.</a:t>
             </a:r>
           </a:p>
         </p:txBody>

</xml_diff>